<commit_message>
add manual for meta data export
</commit_message>
<xml_diff>
--- a/mtpy/tstools/manual/manual.pptx
+++ b/mtpy/tstools/manual/manual.pptx
@@ -4524,7 +4524,7 @@
       </p:grpSpPr>
       <p:pic>
         <p:nvPicPr>
-          <p:cNvPr id="4098" name="Picture 2"/>
+          <p:cNvPr id="1028" name="Picture 4"/>
           <p:cNvPicPr>
             <a:picLocks noChangeAspect="1" noChangeArrowheads="1"/>
           </p:cNvPicPr>
@@ -4545,8 +4545,8 @@
         </p:blipFill>
         <p:spPr bwMode="auto">
           <a:xfrm>
-            <a:off x="-9525" y="548680"/>
-            <a:ext cx="9153525" cy="5457825"/>
+            <a:off x="7376" y="548679"/>
+            <a:ext cx="9144000" cy="5457825"/>
           </a:xfrm>
           <a:prstGeom prst="rect">
             <a:avLst/>
@@ -4805,6 +4805,90 @@
             <a:r>
               <a:rPr lang="en-AU" dirty="0" smtClean="0"/>
               <a:t>at the original sample rate</a:t>
+            </a:r>
+            <a:endParaRPr lang="en-AU" dirty="0"/>
+          </a:p>
+        </p:txBody>
+      </p:sp>
+      <p:cxnSp>
+        <p:nvCxnSpPr>
+          <p:cNvPr id="13" name="Straight Arrow Connector 12"/>
+          <p:cNvCxnSpPr/>
+          <p:nvPr/>
+        </p:nvCxnSpPr>
+        <p:spPr>
+          <a:xfrm>
+            <a:off x="7524328" y="5408349"/>
+            <a:ext cx="288032" cy="238115"/>
+          </a:xfrm>
+          <a:prstGeom prst="straightConnector1">
+            <a:avLst/>
+          </a:prstGeom>
+          <a:ln w="28575">
+            <a:tailEnd type="arrow"/>
+          </a:ln>
+        </p:spPr>
+        <p:style>
+          <a:lnRef idx="1">
+            <a:schemeClr val="accent2"/>
+          </a:lnRef>
+          <a:fillRef idx="0">
+            <a:schemeClr val="accent2"/>
+          </a:fillRef>
+          <a:effectRef idx="0">
+            <a:schemeClr val="accent2"/>
+          </a:effectRef>
+          <a:fontRef idx="minor">
+            <a:schemeClr val="tx1"/>
+          </a:fontRef>
+        </p:style>
+      </p:cxnSp>
+      <p:sp>
+        <p:nvSpPr>
+          <p:cNvPr id="14" name="TextBox 13"/>
+          <p:cNvSpPr txBox="1"/>
+          <p:nvPr/>
+        </p:nvSpPr>
+        <p:spPr>
+          <a:xfrm>
+            <a:off x="2843808" y="5085184"/>
+            <a:ext cx="5004960" cy="369332"/>
+          </a:xfrm>
+          <a:prstGeom prst="rect">
+            <a:avLst/>
+          </a:prstGeom>
+        </p:spPr>
+        <p:style>
+          <a:lnRef idx="1">
+            <a:schemeClr val="accent2"/>
+          </a:lnRef>
+          <a:fillRef idx="3">
+            <a:schemeClr val="accent2"/>
+          </a:fillRef>
+          <a:effectRef idx="2">
+            <a:schemeClr val="accent2"/>
+          </a:effectRef>
+          <a:fontRef idx="minor">
+            <a:schemeClr val="lt1"/>
+          </a:fontRef>
+        </p:style>
+        <p:txBody>
+          <a:bodyPr wrap="none" rtlCol="0">
+            <a:spAutoFit/>
+          </a:bodyPr>
+          <a:lstStyle/>
+          <a:p>
+            <a:r>
+              <a:rPr lang="en-AU" dirty="0" smtClean="0"/>
+              <a:t>Export </a:t>
+            </a:r>
+            <a:r>
+              <a:rPr lang="en-AU" dirty="0" smtClean="0"/>
+              <a:t>meta data of all waveforms </a:t>
+            </a:r>
+            <a:r>
+              <a:rPr lang="en-AU" dirty="0" smtClean="0"/>
+              <a:t>on the list above</a:t>
             </a:r>
             <a:endParaRPr lang="en-AU" dirty="0"/>
           </a:p>

</xml_diff>